<commit_message>
Progress in WS1 for WP5 & added quarto resources
</commit_message>
<xml_diff>
--- a/r_package/testing/Workshops_and_demos/WS_WP5/images/images_for_presentation.pptx
+++ b/r_package/testing/Workshops_and_demos/WS_WP5/images/images_for_presentation.pptx
@@ -8,6 +8,8 @@
     <p:sldId id="256" r:id="rId2"/>
     <p:sldId id="257" r:id="rId3"/>
     <p:sldId id="258" r:id="rId4"/>
+    <p:sldId id="260" r:id="rId5"/>
+    <p:sldId id="259" r:id="rId6"/>
   </p:sldIdLst>
   <p:sldSz cx="12192000" cy="6858000"/>
   <p:notesSz cx="6858000" cy="9144000"/>
@@ -261,7 +263,7 @@
           <a:p>
             <a:fld id="{2AECC169-8D99-43BA-9020-AC448D8397CC}" type="datetimeFigureOut">
               <a:rPr lang="en-US" smtClean="0"/>
-              <a:t>3/12/2025</a:t>
+              <a:t>3/18/2025</a:t>
             </a:fld>
             <a:endParaRPr lang="en-US"/>
           </a:p>
@@ -459,7 +461,7 @@
           <a:p>
             <a:fld id="{2AECC169-8D99-43BA-9020-AC448D8397CC}" type="datetimeFigureOut">
               <a:rPr lang="en-US" smtClean="0"/>
-              <a:t>3/12/2025</a:t>
+              <a:t>3/18/2025</a:t>
             </a:fld>
             <a:endParaRPr lang="en-US"/>
           </a:p>
@@ -667,7 +669,7 @@
           <a:p>
             <a:fld id="{2AECC169-8D99-43BA-9020-AC448D8397CC}" type="datetimeFigureOut">
               <a:rPr lang="en-US" smtClean="0"/>
-              <a:t>3/12/2025</a:t>
+              <a:t>3/18/2025</a:t>
             </a:fld>
             <a:endParaRPr lang="en-US"/>
           </a:p>
@@ -865,7 +867,7 @@
           <a:p>
             <a:fld id="{2AECC169-8D99-43BA-9020-AC448D8397CC}" type="datetimeFigureOut">
               <a:rPr lang="en-US" smtClean="0"/>
-              <a:t>3/12/2025</a:t>
+              <a:t>3/18/2025</a:t>
             </a:fld>
             <a:endParaRPr lang="en-US"/>
           </a:p>
@@ -1140,7 +1142,7 @@
           <a:p>
             <a:fld id="{2AECC169-8D99-43BA-9020-AC448D8397CC}" type="datetimeFigureOut">
               <a:rPr lang="en-US" smtClean="0"/>
-              <a:t>3/12/2025</a:t>
+              <a:t>3/18/2025</a:t>
             </a:fld>
             <a:endParaRPr lang="en-US"/>
           </a:p>
@@ -1405,7 +1407,7 @@
           <a:p>
             <a:fld id="{2AECC169-8D99-43BA-9020-AC448D8397CC}" type="datetimeFigureOut">
               <a:rPr lang="en-US" smtClean="0"/>
-              <a:t>3/12/2025</a:t>
+              <a:t>3/18/2025</a:t>
             </a:fld>
             <a:endParaRPr lang="en-US"/>
           </a:p>
@@ -1817,7 +1819,7 @@
           <a:p>
             <a:fld id="{2AECC169-8D99-43BA-9020-AC448D8397CC}" type="datetimeFigureOut">
               <a:rPr lang="en-US" smtClean="0"/>
-              <a:t>3/12/2025</a:t>
+              <a:t>3/18/2025</a:t>
             </a:fld>
             <a:endParaRPr lang="en-US"/>
           </a:p>
@@ -1958,7 +1960,7 @@
           <a:p>
             <a:fld id="{2AECC169-8D99-43BA-9020-AC448D8397CC}" type="datetimeFigureOut">
               <a:rPr lang="en-US" smtClean="0"/>
-              <a:t>3/12/2025</a:t>
+              <a:t>3/18/2025</a:t>
             </a:fld>
             <a:endParaRPr lang="en-US"/>
           </a:p>
@@ -2071,7 +2073,7 @@
           <a:p>
             <a:fld id="{2AECC169-8D99-43BA-9020-AC448D8397CC}" type="datetimeFigureOut">
               <a:rPr lang="en-US" smtClean="0"/>
-              <a:t>3/12/2025</a:t>
+              <a:t>3/18/2025</a:t>
             </a:fld>
             <a:endParaRPr lang="en-US"/>
           </a:p>
@@ -2382,7 +2384,7 @@
           <a:p>
             <a:fld id="{2AECC169-8D99-43BA-9020-AC448D8397CC}" type="datetimeFigureOut">
               <a:rPr lang="en-US" smtClean="0"/>
-              <a:t>3/12/2025</a:t>
+              <a:t>3/18/2025</a:t>
             </a:fld>
             <a:endParaRPr lang="en-US"/>
           </a:p>
@@ -2670,7 +2672,7 @@
           <a:p>
             <a:fld id="{2AECC169-8D99-43BA-9020-AC448D8397CC}" type="datetimeFigureOut">
               <a:rPr lang="en-US" smtClean="0"/>
-              <a:t>3/12/2025</a:t>
+              <a:t>3/18/2025</a:t>
             </a:fld>
             <a:endParaRPr lang="en-US"/>
           </a:p>
@@ -2911,7 +2913,7 @@
           <a:p>
             <a:fld id="{2AECC169-8D99-43BA-9020-AC448D8397CC}" type="datetimeFigureOut">
               <a:rPr lang="en-US" smtClean="0"/>
-              <a:t>3/12/2025</a:t>
+              <a:t>3/18/2025</a:t>
             </a:fld>
             <a:endParaRPr lang="en-US"/>
           </a:p>
@@ -3806,6 +3808,587 @@
 </p:sld>
 </file>
 
+<file path=ppt/slides/slide4.xml><?xml version="1.0" encoding="utf-8"?>
+<p:sld xmlns:a="http://schemas.openxmlformats.org/drawingml/2006/main" xmlns:r="http://schemas.openxmlformats.org/officeDocument/2006/relationships" xmlns:p="http://schemas.openxmlformats.org/presentationml/2006/main">
+  <p:cSld>
+    <p:spTree>
+      <p:nvGrpSpPr>
+        <p:cNvPr id="1" name=""/>
+        <p:cNvGrpSpPr/>
+        <p:nvPr/>
+      </p:nvGrpSpPr>
+      <p:grpSpPr>
+        <a:xfrm>
+          <a:off x="0" y="0"/>
+          <a:ext cx="0" cy="0"/>
+          <a:chOff x="0" y="0"/>
+          <a:chExt cx="0" cy="0"/>
+        </a:xfrm>
+      </p:grpSpPr>
+      <p:pic>
+        <p:nvPicPr>
+          <p:cNvPr id="5" name="Picture 4" descr="A screenshot of a computer&#10;&#10;AI-generated content may be incorrect.">
+            <a:extLst>
+              <a:ext uri="{FF2B5EF4-FFF2-40B4-BE49-F238E27FC236}">
+                <a16:creationId xmlns:a16="http://schemas.microsoft.com/office/drawing/2014/main" id="{0F958FA7-5DD1-BE1E-06FD-A0C126E846FD}"/>
+              </a:ext>
+            </a:extLst>
+          </p:cNvPr>
+          <p:cNvPicPr>
+            <a:picLocks noChangeAspect="1"/>
+          </p:cNvPicPr>
+          <p:nvPr/>
+        </p:nvPicPr>
+        <p:blipFill>
+          <a:blip r:embed="rId2"/>
+          <a:stretch>
+            <a:fillRect/>
+          </a:stretch>
+        </p:blipFill>
+        <p:spPr>
+          <a:xfrm>
+            <a:off x="0" y="1321618"/>
+            <a:ext cx="12192000" cy="4214764"/>
+          </a:xfrm>
+          <a:prstGeom prst="rect">
+            <a:avLst/>
+          </a:prstGeom>
+        </p:spPr>
+      </p:pic>
+      <p:sp>
+        <p:nvSpPr>
+          <p:cNvPr id="7" name="TextBox 6">
+            <a:extLst>
+              <a:ext uri="{FF2B5EF4-FFF2-40B4-BE49-F238E27FC236}">
+                <a16:creationId xmlns:a16="http://schemas.microsoft.com/office/drawing/2014/main" id="{242BF697-E166-9758-9697-5E886E912C20}"/>
+              </a:ext>
+            </a:extLst>
+          </p:cNvPr>
+          <p:cNvSpPr txBox="1"/>
+          <p:nvPr/>
+        </p:nvSpPr>
+        <p:spPr>
+          <a:xfrm>
+            <a:off x="4177144" y="3652002"/>
+            <a:ext cx="5056911" cy="369332"/>
+          </a:xfrm>
+          <a:prstGeom prst="rect">
+            <a:avLst/>
+          </a:prstGeom>
+          <a:noFill/>
+        </p:spPr>
+        <p:txBody>
+          <a:bodyPr wrap="square" rtlCol="0">
+            <a:spAutoFit/>
+          </a:bodyPr>
+          <a:lstStyle/>
+          <a:p>
+            <a:r>
+              <a:rPr lang="en-US" dirty="0">
+                <a:solidFill>
+                  <a:srgbClr val="FF0000"/>
+                </a:solidFill>
+              </a:rPr>
+              <a:t>Find here the intro vignette </a:t>
+            </a:r>
+            <a:r>
+              <a:rPr lang="en-US" i="1" dirty="0">
+                <a:solidFill>
+                  <a:srgbClr val="FF0000"/>
+                </a:solidFill>
+              </a:rPr>
+              <a:t>intro_to_healthiar</a:t>
+            </a:r>
+            <a:endParaRPr lang="en-US" dirty="0">
+              <a:solidFill>
+                <a:srgbClr val="FF0000"/>
+              </a:solidFill>
+            </a:endParaRPr>
+          </a:p>
+        </p:txBody>
+      </p:sp>
+      <p:sp>
+        <p:nvSpPr>
+          <p:cNvPr id="8" name="Rectangle 7">
+            <a:extLst>
+              <a:ext uri="{FF2B5EF4-FFF2-40B4-BE49-F238E27FC236}">
+                <a16:creationId xmlns:a16="http://schemas.microsoft.com/office/drawing/2014/main" id="{6D9227E1-7003-A028-DEA5-31F3509D8D03}"/>
+              </a:ext>
+            </a:extLst>
+          </p:cNvPr>
+          <p:cNvSpPr/>
+          <p:nvPr/>
+        </p:nvSpPr>
+        <p:spPr>
+          <a:xfrm>
+            <a:off x="1288473" y="3724792"/>
+            <a:ext cx="1212272" cy="230681"/>
+          </a:xfrm>
+          <a:prstGeom prst="rect">
+            <a:avLst/>
+          </a:prstGeom>
+          <a:noFill/>
+          <a:ln>
+            <a:solidFill>
+              <a:srgbClr val="FF0000"/>
+            </a:solidFill>
+          </a:ln>
+        </p:spPr>
+        <p:style>
+          <a:lnRef idx="2">
+            <a:schemeClr val="accent1">
+              <a:shade val="15000"/>
+            </a:schemeClr>
+          </a:lnRef>
+          <a:fillRef idx="1">
+            <a:schemeClr val="accent1"/>
+          </a:fillRef>
+          <a:effectRef idx="0">
+            <a:schemeClr val="accent1"/>
+          </a:effectRef>
+          <a:fontRef idx="minor">
+            <a:schemeClr val="lt1"/>
+          </a:fontRef>
+        </p:style>
+        <p:txBody>
+          <a:bodyPr rtlCol="0" anchor="ctr"/>
+          <a:lstStyle/>
+          <a:p>
+            <a:pPr algn="ctr"/>
+            <a:endParaRPr lang="en-US"/>
+          </a:p>
+        </p:txBody>
+      </p:sp>
+      <p:sp>
+        <p:nvSpPr>
+          <p:cNvPr id="9" name="TextBox 8">
+            <a:extLst>
+              <a:ext uri="{FF2B5EF4-FFF2-40B4-BE49-F238E27FC236}">
+                <a16:creationId xmlns:a16="http://schemas.microsoft.com/office/drawing/2014/main" id="{8C658B96-C29F-ACB3-57B1-26A6C40F3A4B}"/>
+              </a:ext>
+            </a:extLst>
+          </p:cNvPr>
+          <p:cNvSpPr txBox="1"/>
+          <p:nvPr/>
+        </p:nvSpPr>
+        <p:spPr>
+          <a:xfrm>
+            <a:off x="1530926" y="4128655"/>
+            <a:ext cx="4433455" cy="369332"/>
+          </a:xfrm>
+          <a:prstGeom prst="rect">
+            <a:avLst/>
+          </a:prstGeom>
+          <a:noFill/>
+        </p:spPr>
+        <p:txBody>
+          <a:bodyPr wrap="square" rtlCol="0">
+            <a:spAutoFit/>
+          </a:bodyPr>
+          <a:lstStyle/>
+          <a:p>
+            <a:r>
+              <a:rPr lang="en-US" dirty="0">
+                <a:solidFill>
+                  <a:srgbClr val="FF0000"/>
+                </a:solidFill>
+              </a:rPr>
+              <a:t>= function documentations</a:t>
+            </a:r>
+          </a:p>
+        </p:txBody>
+      </p:sp>
+      <p:sp>
+        <p:nvSpPr>
+          <p:cNvPr id="10" name="Rectangle 9">
+            <a:extLst>
+              <a:ext uri="{FF2B5EF4-FFF2-40B4-BE49-F238E27FC236}">
+                <a16:creationId xmlns:a16="http://schemas.microsoft.com/office/drawing/2014/main" id="{1FC66A1F-37EA-9A82-1C25-9E2FD28966C3}"/>
+              </a:ext>
+            </a:extLst>
+          </p:cNvPr>
+          <p:cNvSpPr/>
+          <p:nvPr/>
+        </p:nvSpPr>
+        <p:spPr>
+          <a:xfrm>
+            <a:off x="0" y="4128655"/>
+            <a:ext cx="1530927" cy="360218"/>
+          </a:xfrm>
+          <a:prstGeom prst="rect">
+            <a:avLst/>
+          </a:prstGeom>
+          <a:noFill/>
+          <a:ln>
+            <a:solidFill>
+              <a:srgbClr val="FF0000"/>
+            </a:solidFill>
+          </a:ln>
+        </p:spPr>
+        <p:style>
+          <a:lnRef idx="2">
+            <a:schemeClr val="accent1">
+              <a:shade val="15000"/>
+            </a:schemeClr>
+          </a:lnRef>
+          <a:fillRef idx="1">
+            <a:schemeClr val="accent1"/>
+          </a:fillRef>
+          <a:effectRef idx="0">
+            <a:schemeClr val="accent1"/>
+          </a:effectRef>
+          <a:fontRef idx="minor">
+            <a:schemeClr val="lt1"/>
+          </a:fontRef>
+        </p:style>
+        <p:txBody>
+          <a:bodyPr rtlCol="0" anchor="ctr"/>
+          <a:lstStyle/>
+          <a:p>
+            <a:pPr algn="ctr"/>
+            <a:endParaRPr lang="en-US"/>
+          </a:p>
+        </p:txBody>
+      </p:sp>
+      <p:sp>
+        <p:nvSpPr>
+          <p:cNvPr id="11" name="TextBox 10">
+            <a:extLst>
+              <a:ext uri="{FF2B5EF4-FFF2-40B4-BE49-F238E27FC236}">
+                <a16:creationId xmlns:a16="http://schemas.microsoft.com/office/drawing/2014/main" id="{E291B68F-600E-48E9-992D-74F3378917B6}"/>
+              </a:ext>
+            </a:extLst>
+          </p:cNvPr>
+          <p:cNvSpPr txBox="1"/>
+          <p:nvPr/>
+        </p:nvSpPr>
+        <p:spPr>
+          <a:xfrm>
+            <a:off x="-48490" y="5438307"/>
+            <a:ext cx="457200" cy="369332"/>
+          </a:xfrm>
+          <a:prstGeom prst="rect">
+            <a:avLst/>
+          </a:prstGeom>
+          <a:noFill/>
+        </p:spPr>
+        <p:txBody>
+          <a:bodyPr wrap="square" rtlCol="0">
+            <a:spAutoFit/>
+          </a:bodyPr>
+          <a:lstStyle/>
+          <a:p>
+            <a:r>
+              <a:rPr lang="en-US" dirty="0">
+                <a:solidFill>
+                  <a:srgbClr val="FF0000"/>
+                </a:solidFill>
+              </a:rPr>
+              <a:t>…</a:t>
+            </a:r>
+          </a:p>
+        </p:txBody>
+      </p:sp>
+      <p:sp>
+        <p:nvSpPr>
+          <p:cNvPr id="12" name="TextBox 11">
+            <a:extLst>
+              <a:ext uri="{FF2B5EF4-FFF2-40B4-BE49-F238E27FC236}">
+                <a16:creationId xmlns:a16="http://schemas.microsoft.com/office/drawing/2014/main" id="{13D320FD-995A-5165-2564-0BF04F75C9FF}"/>
+              </a:ext>
+            </a:extLst>
+          </p:cNvPr>
+          <p:cNvSpPr txBox="1"/>
+          <p:nvPr/>
+        </p:nvSpPr>
+        <p:spPr>
+          <a:xfrm>
+            <a:off x="2992582" y="5438307"/>
+            <a:ext cx="457200" cy="369332"/>
+          </a:xfrm>
+          <a:prstGeom prst="rect">
+            <a:avLst/>
+          </a:prstGeom>
+          <a:noFill/>
+        </p:spPr>
+        <p:txBody>
+          <a:bodyPr wrap="square" rtlCol="0">
+            <a:spAutoFit/>
+          </a:bodyPr>
+          <a:lstStyle/>
+          <a:p>
+            <a:r>
+              <a:rPr lang="en-US" dirty="0">
+                <a:solidFill>
+                  <a:srgbClr val="FF0000"/>
+                </a:solidFill>
+              </a:rPr>
+              <a:t>…</a:t>
+            </a:r>
+          </a:p>
+        </p:txBody>
+      </p:sp>
+    </p:spTree>
+    <p:extLst>
+      <p:ext uri="{BB962C8B-B14F-4D97-AF65-F5344CB8AC3E}">
+        <p14:creationId xmlns:p14="http://schemas.microsoft.com/office/powerpoint/2010/main" val="1982995038"/>
+      </p:ext>
+    </p:extLst>
+  </p:cSld>
+  <p:clrMapOvr>
+    <a:masterClrMapping/>
+  </p:clrMapOvr>
+</p:sld>
+</file>
+
+<file path=ppt/slides/slide5.xml><?xml version="1.0" encoding="utf-8"?>
+<p:sld xmlns:a="http://schemas.openxmlformats.org/drawingml/2006/main" xmlns:r="http://schemas.openxmlformats.org/officeDocument/2006/relationships" xmlns:p="http://schemas.openxmlformats.org/presentationml/2006/main">
+  <p:cSld>
+    <p:spTree>
+      <p:nvGrpSpPr>
+        <p:cNvPr id="1" name=""/>
+        <p:cNvGrpSpPr/>
+        <p:nvPr/>
+      </p:nvGrpSpPr>
+      <p:grpSpPr>
+        <a:xfrm>
+          <a:off x="0" y="0"/>
+          <a:ext cx="0" cy="0"/>
+          <a:chOff x="0" y="0"/>
+          <a:chExt cx="0" cy="0"/>
+        </a:xfrm>
+      </p:grpSpPr>
+      <p:pic>
+        <p:nvPicPr>
+          <p:cNvPr id="4" name="Picture 3">
+            <a:extLst>
+              <a:ext uri="{FF2B5EF4-FFF2-40B4-BE49-F238E27FC236}">
+                <a16:creationId xmlns:a16="http://schemas.microsoft.com/office/drawing/2014/main" id="{7B86B0D2-2D07-A5A7-28A6-F02491C19724}"/>
+              </a:ext>
+            </a:extLst>
+          </p:cNvPr>
+          <p:cNvPicPr>
+            <a:picLocks noChangeAspect="1"/>
+          </p:cNvPicPr>
+          <p:nvPr/>
+        </p:nvPicPr>
+        <p:blipFill>
+          <a:blip r:embed="rId2"/>
+          <a:stretch>
+            <a:fillRect/>
+          </a:stretch>
+        </p:blipFill>
+        <p:spPr>
+          <a:xfrm>
+            <a:off x="3211487" y="0"/>
+            <a:ext cx="5769026" cy="6858000"/>
+          </a:xfrm>
+          <a:prstGeom prst="rect">
+            <a:avLst/>
+          </a:prstGeom>
+        </p:spPr>
+      </p:pic>
+      <p:sp>
+        <p:nvSpPr>
+          <p:cNvPr id="5" name="Oval 4">
+            <a:extLst>
+              <a:ext uri="{FF2B5EF4-FFF2-40B4-BE49-F238E27FC236}">
+                <a16:creationId xmlns:a16="http://schemas.microsoft.com/office/drawing/2014/main" id="{5948C8DC-B7D1-AB09-8671-47451A3D14BA}"/>
+              </a:ext>
+            </a:extLst>
+          </p:cNvPr>
+          <p:cNvSpPr/>
+          <p:nvPr/>
+        </p:nvSpPr>
+        <p:spPr>
+          <a:xfrm>
+            <a:off x="5074920" y="419100"/>
+            <a:ext cx="937260" cy="487680"/>
+          </a:xfrm>
+          <a:prstGeom prst="ellipse">
+            <a:avLst/>
+          </a:prstGeom>
+          <a:noFill/>
+          <a:ln>
+            <a:solidFill>
+              <a:srgbClr val="FF0000"/>
+            </a:solidFill>
+          </a:ln>
+        </p:spPr>
+        <p:style>
+          <a:lnRef idx="2">
+            <a:schemeClr val="accent6"/>
+          </a:lnRef>
+          <a:fillRef idx="1">
+            <a:schemeClr val="lt1"/>
+          </a:fillRef>
+          <a:effectRef idx="0">
+            <a:schemeClr val="accent6"/>
+          </a:effectRef>
+          <a:fontRef idx="minor">
+            <a:schemeClr val="dk1"/>
+          </a:fontRef>
+        </p:style>
+        <p:txBody>
+          <a:bodyPr rtlCol="0" anchor="ctr"/>
+          <a:lstStyle/>
+          <a:p>
+            <a:pPr algn="ctr"/>
+            <a:endParaRPr lang="en-US"/>
+          </a:p>
+        </p:txBody>
+      </p:sp>
+      <p:sp>
+        <p:nvSpPr>
+          <p:cNvPr id="6" name="Oval 5">
+            <a:extLst>
+              <a:ext uri="{FF2B5EF4-FFF2-40B4-BE49-F238E27FC236}">
+                <a16:creationId xmlns:a16="http://schemas.microsoft.com/office/drawing/2014/main" id="{927E247C-8510-C8DB-FC14-AB0BE241E083}"/>
+              </a:ext>
+            </a:extLst>
+          </p:cNvPr>
+          <p:cNvSpPr/>
+          <p:nvPr/>
+        </p:nvSpPr>
+        <p:spPr>
+          <a:xfrm>
+            <a:off x="3537065" y="1676399"/>
+            <a:ext cx="723207" cy="338743"/>
+          </a:xfrm>
+          <a:prstGeom prst="ellipse">
+            <a:avLst/>
+          </a:prstGeom>
+          <a:noFill/>
+          <a:ln>
+            <a:solidFill>
+              <a:srgbClr val="FF0000"/>
+            </a:solidFill>
+          </a:ln>
+        </p:spPr>
+        <p:style>
+          <a:lnRef idx="2">
+            <a:schemeClr val="accent6"/>
+          </a:lnRef>
+          <a:fillRef idx="1">
+            <a:schemeClr val="lt1"/>
+          </a:fillRef>
+          <a:effectRef idx="0">
+            <a:schemeClr val="accent6"/>
+          </a:effectRef>
+          <a:fontRef idx="minor">
+            <a:schemeClr val="dk1"/>
+          </a:fontRef>
+        </p:style>
+        <p:txBody>
+          <a:bodyPr rtlCol="0" anchor="ctr"/>
+          <a:lstStyle/>
+          <a:p>
+            <a:pPr algn="ctr"/>
+            <a:endParaRPr lang="en-US"/>
+          </a:p>
+        </p:txBody>
+      </p:sp>
+      <p:sp>
+        <p:nvSpPr>
+          <p:cNvPr id="7" name="TextBox 6">
+            <a:extLst>
+              <a:ext uri="{FF2B5EF4-FFF2-40B4-BE49-F238E27FC236}">
+                <a16:creationId xmlns:a16="http://schemas.microsoft.com/office/drawing/2014/main" id="{15549E62-3A94-9288-112B-26462F3D701B}"/>
+              </a:ext>
+            </a:extLst>
+          </p:cNvPr>
+          <p:cNvSpPr txBox="1"/>
+          <p:nvPr/>
+        </p:nvSpPr>
+        <p:spPr>
+          <a:xfrm>
+            <a:off x="5061760" y="148937"/>
+            <a:ext cx="277784" cy="369332"/>
+          </a:xfrm>
+          <a:prstGeom prst="rect">
+            <a:avLst/>
+          </a:prstGeom>
+          <a:noFill/>
+        </p:spPr>
+        <p:txBody>
+          <a:bodyPr wrap="square" rtlCol="0">
+            <a:spAutoFit/>
+          </a:bodyPr>
+          <a:lstStyle/>
+          <a:p>
+            <a:r>
+              <a:rPr lang="de-CH" dirty="0">
+                <a:solidFill>
+                  <a:srgbClr val="FF0000"/>
+                </a:solidFill>
+              </a:rPr>
+              <a:t>1</a:t>
+            </a:r>
+            <a:endParaRPr lang="en-US" dirty="0">
+              <a:solidFill>
+                <a:srgbClr val="FF0000"/>
+              </a:solidFill>
+            </a:endParaRPr>
+          </a:p>
+        </p:txBody>
+      </p:sp>
+      <p:sp>
+        <p:nvSpPr>
+          <p:cNvPr id="8" name="TextBox 7">
+            <a:extLst>
+              <a:ext uri="{FF2B5EF4-FFF2-40B4-BE49-F238E27FC236}">
+                <a16:creationId xmlns:a16="http://schemas.microsoft.com/office/drawing/2014/main" id="{CDB4B61E-A104-90C2-5B14-C3900BE28ECC}"/>
+              </a:ext>
+            </a:extLst>
+          </p:cNvPr>
+          <p:cNvSpPr txBox="1"/>
+          <p:nvPr/>
+        </p:nvSpPr>
+        <p:spPr>
+          <a:xfrm>
+            <a:off x="4260272" y="1688175"/>
+            <a:ext cx="277784" cy="369332"/>
+          </a:xfrm>
+          <a:prstGeom prst="rect">
+            <a:avLst/>
+          </a:prstGeom>
+          <a:noFill/>
+        </p:spPr>
+        <p:txBody>
+          <a:bodyPr wrap="square" rtlCol="0">
+            <a:spAutoFit/>
+          </a:bodyPr>
+          <a:lstStyle/>
+          <a:p>
+            <a:r>
+              <a:rPr lang="de-CH" dirty="0">
+                <a:solidFill>
+                  <a:srgbClr val="FF0000"/>
+                </a:solidFill>
+              </a:rPr>
+              <a:t>2</a:t>
+            </a:r>
+            <a:endParaRPr lang="en-US" dirty="0">
+              <a:solidFill>
+                <a:srgbClr val="FF0000"/>
+              </a:solidFill>
+            </a:endParaRPr>
+          </a:p>
+        </p:txBody>
+      </p:sp>
+    </p:spTree>
+    <p:extLst>
+      <p:ext uri="{BB962C8B-B14F-4D97-AF65-F5344CB8AC3E}">
+        <p14:creationId xmlns:p14="http://schemas.microsoft.com/office/powerpoint/2010/main" val="1267758350"/>
+      </p:ext>
+    </p:extLst>
+  </p:cSld>
+  <p:clrMapOvr>
+    <a:masterClrMapping/>
+  </p:clrMapOvr>
+</p:sld>
+</file>
+
 <file path=ppt/theme/theme1.xml><?xml version="1.0" encoding="utf-8"?>
 <a:theme xmlns:a="http://schemas.openxmlformats.org/drawingml/2006/main" name="Office Theme">
   <a:themeElements>

</xml_diff>

<commit_message>
Workshop version sent to WP4 partners and uploaded to Teams
</commit_message>
<xml_diff>
--- a/r_package/testing/Workshops_and_demos/WS_WP5/images/images_for_presentation.pptx
+++ b/r_package/testing/Workshops_and_demos/WS_WP5/images/images_for_presentation.pptx
@@ -267,7 +267,7 @@
           <a:p>
             <a:fld id="{2AECC169-8D99-43BA-9020-AC448D8397CC}" type="datetimeFigureOut">
               <a:rPr lang="en-US" smtClean="0"/>
-              <a:t>3/22/2025</a:t>
+              <a:t>3/24/2025</a:t>
             </a:fld>
             <a:endParaRPr lang="en-US"/>
           </a:p>
@@ -465,7 +465,7 @@
           <a:p>
             <a:fld id="{2AECC169-8D99-43BA-9020-AC448D8397CC}" type="datetimeFigureOut">
               <a:rPr lang="en-US" smtClean="0"/>
-              <a:t>3/22/2025</a:t>
+              <a:t>3/24/2025</a:t>
             </a:fld>
             <a:endParaRPr lang="en-US"/>
           </a:p>
@@ -673,7 +673,7 @@
           <a:p>
             <a:fld id="{2AECC169-8D99-43BA-9020-AC448D8397CC}" type="datetimeFigureOut">
               <a:rPr lang="en-US" smtClean="0"/>
-              <a:t>3/22/2025</a:t>
+              <a:t>3/24/2025</a:t>
             </a:fld>
             <a:endParaRPr lang="en-US"/>
           </a:p>
@@ -871,7 +871,7 @@
           <a:p>
             <a:fld id="{2AECC169-8D99-43BA-9020-AC448D8397CC}" type="datetimeFigureOut">
               <a:rPr lang="en-US" smtClean="0"/>
-              <a:t>3/22/2025</a:t>
+              <a:t>3/24/2025</a:t>
             </a:fld>
             <a:endParaRPr lang="en-US"/>
           </a:p>
@@ -1146,7 +1146,7 @@
           <a:p>
             <a:fld id="{2AECC169-8D99-43BA-9020-AC448D8397CC}" type="datetimeFigureOut">
               <a:rPr lang="en-US" smtClean="0"/>
-              <a:t>3/22/2025</a:t>
+              <a:t>3/24/2025</a:t>
             </a:fld>
             <a:endParaRPr lang="en-US"/>
           </a:p>
@@ -1411,7 +1411,7 @@
           <a:p>
             <a:fld id="{2AECC169-8D99-43BA-9020-AC448D8397CC}" type="datetimeFigureOut">
               <a:rPr lang="en-US" smtClean="0"/>
-              <a:t>3/22/2025</a:t>
+              <a:t>3/24/2025</a:t>
             </a:fld>
             <a:endParaRPr lang="en-US"/>
           </a:p>
@@ -1823,7 +1823,7 @@
           <a:p>
             <a:fld id="{2AECC169-8D99-43BA-9020-AC448D8397CC}" type="datetimeFigureOut">
               <a:rPr lang="en-US" smtClean="0"/>
-              <a:t>3/22/2025</a:t>
+              <a:t>3/24/2025</a:t>
             </a:fld>
             <a:endParaRPr lang="en-US"/>
           </a:p>
@@ -1964,7 +1964,7 @@
           <a:p>
             <a:fld id="{2AECC169-8D99-43BA-9020-AC448D8397CC}" type="datetimeFigureOut">
               <a:rPr lang="en-US" smtClean="0"/>
-              <a:t>3/22/2025</a:t>
+              <a:t>3/24/2025</a:t>
             </a:fld>
             <a:endParaRPr lang="en-US"/>
           </a:p>
@@ -2077,7 +2077,7 @@
           <a:p>
             <a:fld id="{2AECC169-8D99-43BA-9020-AC448D8397CC}" type="datetimeFigureOut">
               <a:rPr lang="en-US" smtClean="0"/>
-              <a:t>3/22/2025</a:t>
+              <a:t>3/24/2025</a:t>
             </a:fld>
             <a:endParaRPr lang="en-US"/>
           </a:p>
@@ -2388,7 +2388,7 @@
           <a:p>
             <a:fld id="{2AECC169-8D99-43BA-9020-AC448D8397CC}" type="datetimeFigureOut">
               <a:rPr lang="en-US" smtClean="0"/>
-              <a:t>3/22/2025</a:t>
+              <a:t>3/24/2025</a:t>
             </a:fld>
             <a:endParaRPr lang="en-US"/>
           </a:p>
@@ -2676,7 +2676,7 @@
           <a:p>
             <a:fld id="{2AECC169-8D99-43BA-9020-AC448D8397CC}" type="datetimeFigureOut">
               <a:rPr lang="en-US" smtClean="0"/>
-              <a:t>3/22/2025</a:t>
+              <a:t>3/24/2025</a:t>
             </a:fld>
             <a:endParaRPr lang="en-US"/>
           </a:p>
@@ -2917,7 +2917,7 @@
           <a:p>
             <a:fld id="{2AECC169-8D99-43BA-9020-AC448D8397CC}" type="datetimeFigureOut">
               <a:rPr lang="en-US" smtClean="0"/>
-              <a:t>3/22/2025</a:t>
+              <a:t>3/24/2025</a:t>
             </a:fld>
             <a:endParaRPr lang="en-US"/>
           </a:p>
@@ -3935,10 +3935,10 @@
       </p:grpSpPr>
       <p:pic>
         <p:nvPicPr>
-          <p:cNvPr id="5" name="Picture 4" descr="A screenshot of a computer&#10;&#10;AI-generated content may be incorrect.">
+          <p:cNvPr id="3" name="Picture 2">
             <a:extLst>
               <a:ext uri="{FF2B5EF4-FFF2-40B4-BE49-F238E27FC236}">
-                <a16:creationId xmlns:a16="http://schemas.microsoft.com/office/drawing/2014/main" id="{0F958FA7-5DD1-BE1E-06FD-A0C126E846FD}"/>
+                <a16:creationId xmlns:a16="http://schemas.microsoft.com/office/drawing/2014/main" id="{DA0425FD-D513-6712-067D-22DAEFBCEA3E}"/>
               </a:ext>
             </a:extLst>
           </p:cNvPr>
@@ -3955,8 +3955,8 @@
         </p:blipFill>
         <p:spPr>
           <a:xfrm>
-            <a:off x="0" y="1321618"/>
-            <a:ext cx="12192000" cy="4214764"/>
+            <a:off x="1153614" y="692693"/>
+            <a:ext cx="7398130" cy="5512083"/>
           </a:xfrm>
           <a:prstGeom prst="rect">
             <a:avLst/>
@@ -3977,8 +3977,8 @@
         </p:nvSpPr>
         <p:spPr>
           <a:xfrm>
-            <a:off x="4177144" y="3652002"/>
-            <a:ext cx="5056911" cy="369332"/>
+            <a:off x="5742610" y="3546001"/>
+            <a:ext cx="2809134" cy="369332"/>
           </a:xfrm>
           <a:prstGeom prst="rect">
             <a:avLst/>
@@ -3997,21 +3997,8 @@
                   <a:srgbClr val="FF0000"/>
                 </a:solidFill>
               </a:rPr>
-              <a:t>Find here the intro vignette </a:t>
+              <a:t>Find here the intro vignette</a:t>
             </a:r>
-            <a:r>
-              <a:rPr lang="en-US" i="1" dirty="0">
-                <a:solidFill>
-                  <a:srgbClr val="FF0000"/>
-                </a:solidFill>
-              </a:rPr>
-              <a:t>intro_to_healthiar</a:t>
-            </a:r>
-            <a:endParaRPr lang="en-US" dirty="0">
-              <a:solidFill>
-                <a:srgbClr val="FF0000"/>
-              </a:solidFill>
-            </a:endParaRPr>
           </a:p>
         </p:txBody>
       </p:sp>
@@ -4029,8 +4016,8 @@
         </p:nvSpPr>
         <p:spPr>
           <a:xfrm>
-            <a:off x="1288473" y="3724792"/>
-            <a:ext cx="1212272" cy="230681"/>
+            <a:off x="2564686" y="3619538"/>
+            <a:ext cx="1342894" cy="222258"/>
           </a:xfrm>
           <a:prstGeom prst="rect">
             <a:avLst/>
@@ -4081,7 +4068,7 @@
         </p:nvSpPr>
         <p:spPr>
           <a:xfrm>
-            <a:off x="1530926" y="4128655"/>
+            <a:off x="2730043" y="4023400"/>
             <a:ext cx="4433455" cy="369332"/>
           </a:xfrm>
           <a:prstGeom prst="rect">
@@ -4101,7 +4088,7 @@
                   <a:srgbClr val="FF0000"/>
                 </a:solidFill>
               </a:rPr>
-              <a:t>= function documentations</a:t>
+              <a:t>= Function documentations</a:t>
             </a:r>
           </a:p>
         </p:txBody>
@@ -4120,8 +4107,8 @@
         </p:nvSpPr>
         <p:spPr>
           <a:xfrm>
-            <a:off x="0" y="4128655"/>
-            <a:ext cx="1530927" cy="360218"/>
+            <a:off x="1153615" y="4023400"/>
+            <a:ext cx="1576428" cy="360218"/>
           </a:xfrm>
           <a:prstGeom prst="rect">
             <a:avLst/>
@@ -4154,7 +4141,7 @@
           <a:lstStyle/>
           <a:p>
             <a:pPr algn="ctr"/>
-            <a:endParaRPr lang="en-US"/>
+            <a:endParaRPr lang="en-US" dirty="0"/>
           </a:p>
         </p:txBody>
       </p:sp>
@@ -4172,7 +4159,7 @@
         </p:nvSpPr>
         <p:spPr>
           <a:xfrm>
-            <a:off x="-48490" y="5438307"/>
+            <a:off x="1096154" y="6024667"/>
             <a:ext cx="457200" cy="369332"/>
           </a:xfrm>
           <a:prstGeom prst="rect">
@@ -4211,7 +4198,7 @@
         </p:nvSpPr>
         <p:spPr>
           <a:xfrm>
-            <a:off x="2992582" y="5438307"/>
+            <a:off x="4268795" y="5333052"/>
             <a:ext cx="457200" cy="369332"/>
           </a:xfrm>
           <a:prstGeom prst="rect">

</xml_diff>